<commit_message>
Vanjin i moj komit
</commit_message>
<xml_diff>
--- a/Prezentacija.pptx
+++ b/Prezentacija.pptx
@@ -7298,11 +7298,15 @@
             </a:r>
             <a:r>
               <a:rPr lang="en-GB" dirty="0" err="1"/>
-              <a:t>analiya</a:t>
-            </a:r>
-            <a:r>
-              <a:rPr lang="en-GB" dirty="0"/>
-              <a:t> </a:t>
+              <a:t>anali</a:t>
+            </a:r>
+            <a:r>
+              <a:rPr lang="sr-Latn-RS"/>
+              <a:t>z</a:t>
+            </a:r>
+            <a:r>
+              <a:rPr lang="en-GB"/>
+              <a:t>a </a:t>
             </a:r>
             <a:r>
               <a:rPr lang="en-GB" dirty="0" err="1"/>

</xml_diff>